<commit_message>
Committing week 2 project and presentation
</commit_message>
<xml_diff>
--- a/2022-SPR/Week02.pptx
+++ b/2022-SPR/Week02.pptx
@@ -14,6 +14,19 @@
     <p:sldId id="275" r:id="rId8"/>
     <p:sldId id="276" r:id="rId9"/>
     <p:sldId id="277" r:id="rId10"/>
+    <p:sldId id="278" r:id="rId11"/>
+    <p:sldId id="279" r:id="rId12"/>
+    <p:sldId id="280" r:id="rId13"/>
+    <p:sldId id="282" r:id="rId14"/>
+    <p:sldId id="283" r:id="rId15"/>
+    <p:sldId id="284" r:id="rId16"/>
+    <p:sldId id="285" r:id="rId17"/>
+    <p:sldId id="286" r:id="rId18"/>
+    <p:sldId id="287" r:id="rId19"/>
+    <p:sldId id="288" r:id="rId20"/>
+    <p:sldId id="281" r:id="rId21"/>
+    <p:sldId id="289" r:id="rId22"/>
+    <p:sldId id="290" r:id="rId23"/>
   </p:sldIdLst>
   <p:sldSz cx="12192000" cy="6858000"/>
   <p:notesSz cx="6858000" cy="9144000"/>
@@ -267,7 +280,7 @@
           <a:p>
             <a:fld id="{2B1919C7-6BC3-4736-AC32-A62C7B81C82C}" type="datetimeFigureOut">
               <a:rPr lang="en-US" smtClean="0"/>
-              <a:t>1/13/2022</a:t>
+              <a:t>1/17/2022</a:t>
             </a:fld>
             <a:endParaRPr lang="en-US"/>
           </a:p>
@@ -465,7 +478,7 @@
           <a:p>
             <a:fld id="{2B1919C7-6BC3-4736-AC32-A62C7B81C82C}" type="datetimeFigureOut">
               <a:rPr lang="en-US" smtClean="0"/>
-              <a:t>1/13/2022</a:t>
+              <a:t>1/17/2022</a:t>
             </a:fld>
             <a:endParaRPr lang="en-US"/>
           </a:p>
@@ -673,7 +686,7 @@
           <a:p>
             <a:fld id="{2B1919C7-6BC3-4736-AC32-A62C7B81C82C}" type="datetimeFigureOut">
               <a:rPr lang="en-US" smtClean="0"/>
-              <a:t>1/13/2022</a:t>
+              <a:t>1/17/2022</a:t>
             </a:fld>
             <a:endParaRPr lang="en-US"/>
           </a:p>
@@ -871,7 +884,7 @@
           <a:p>
             <a:fld id="{2B1919C7-6BC3-4736-AC32-A62C7B81C82C}" type="datetimeFigureOut">
               <a:rPr lang="en-US" smtClean="0"/>
-              <a:t>1/13/2022</a:t>
+              <a:t>1/17/2022</a:t>
             </a:fld>
             <a:endParaRPr lang="en-US"/>
           </a:p>
@@ -1146,7 +1159,7 @@
           <a:p>
             <a:fld id="{2B1919C7-6BC3-4736-AC32-A62C7B81C82C}" type="datetimeFigureOut">
               <a:rPr lang="en-US" smtClean="0"/>
-              <a:t>1/13/2022</a:t>
+              <a:t>1/17/2022</a:t>
             </a:fld>
             <a:endParaRPr lang="en-US"/>
           </a:p>
@@ -1411,7 +1424,7 @@
           <a:p>
             <a:fld id="{2B1919C7-6BC3-4736-AC32-A62C7B81C82C}" type="datetimeFigureOut">
               <a:rPr lang="en-US" smtClean="0"/>
-              <a:t>1/13/2022</a:t>
+              <a:t>1/17/2022</a:t>
             </a:fld>
             <a:endParaRPr lang="en-US"/>
           </a:p>
@@ -1823,7 +1836,7 @@
           <a:p>
             <a:fld id="{2B1919C7-6BC3-4736-AC32-A62C7B81C82C}" type="datetimeFigureOut">
               <a:rPr lang="en-US" smtClean="0"/>
-              <a:t>1/13/2022</a:t>
+              <a:t>1/17/2022</a:t>
             </a:fld>
             <a:endParaRPr lang="en-US"/>
           </a:p>
@@ -1964,7 +1977,7 @@
           <a:p>
             <a:fld id="{2B1919C7-6BC3-4736-AC32-A62C7B81C82C}" type="datetimeFigureOut">
               <a:rPr lang="en-US" smtClean="0"/>
-              <a:t>1/13/2022</a:t>
+              <a:t>1/17/2022</a:t>
             </a:fld>
             <a:endParaRPr lang="en-US"/>
           </a:p>
@@ -2077,7 +2090,7 @@
           <a:p>
             <a:fld id="{2B1919C7-6BC3-4736-AC32-A62C7B81C82C}" type="datetimeFigureOut">
               <a:rPr lang="en-US" smtClean="0"/>
-              <a:t>1/13/2022</a:t>
+              <a:t>1/17/2022</a:t>
             </a:fld>
             <a:endParaRPr lang="en-US"/>
           </a:p>
@@ -2388,7 +2401,7 @@
           <a:p>
             <a:fld id="{2B1919C7-6BC3-4736-AC32-A62C7B81C82C}" type="datetimeFigureOut">
               <a:rPr lang="en-US" smtClean="0"/>
-              <a:t>1/13/2022</a:t>
+              <a:t>1/17/2022</a:t>
             </a:fld>
             <a:endParaRPr lang="en-US"/>
           </a:p>
@@ -2676,7 +2689,7 @@
           <a:p>
             <a:fld id="{2B1919C7-6BC3-4736-AC32-A62C7B81C82C}" type="datetimeFigureOut">
               <a:rPr lang="en-US" smtClean="0"/>
-              <a:t>1/13/2022</a:t>
+              <a:t>1/17/2022</a:t>
             </a:fld>
             <a:endParaRPr lang="en-US"/>
           </a:p>
@@ -2917,7 +2930,7 @@
           <a:p>
             <a:fld id="{2B1919C7-6BC3-4736-AC32-A62C7B81C82C}" type="datetimeFigureOut">
               <a:rPr lang="en-US" smtClean="0"/>
-              <a:t>1/13/2022</a:t>
+              <a:t>1/17/2022</a:t>
             </a:fld>
             <a:endParaRPr lang="en-US"/>
           </a:p>
@@ -3427,6 +3440,1465 @@
 </p:sld>
 </file>
 
+<file path=ppt/slides/slide10.xml><?xml version="1.0" encoding="utf-8"?>
+<p:sld xmlns:a="http://schemas.openxmlformats.org/drawingml/2006/main" xmlns:r="http://schemas.openxmlformats.org/officeDocument/2006/relationships" xmlns:p="http://schemas.openxmlformats.org/presentationml/2006/main">
+  <p:cSld>
+    <p:spTree>
+      <p:nvGrpSpPr>
+        <p:cNvPr id="1" name=""/>
+        <p:cNvGrpSpPr/>
+        <p:nvPr/>
+      </p:nvGrpSpPr>
+      <p:grpSpPr>
+        <a:xfrm>
+          <a:off x="0" y="0"/>
+          <a:ext cx="0" cy="0"/>
+          <a:chOff x="0" y="0"/>
+          <a:chExt cx="0" cy="0"/>
+        </a:xfrm>
+      </p:grpSpPr>
+      <p:sp>
+        <p:nvSpPr>
+          <p:cNvPr id="2" name="Title 1">
+            <a:extLst>
+              <a:ext uri="{FF2B5EF4-FFF2-40B4-BE49-F238E27FC236}">
+                <a16:creationId xmlns:a16="http://schemas.microsoft.com/office/drawing/2014/main" id="{F831A37A-292B-4C16-BC07-50885050E195}"/>
+              </a:ext>
+            </a:extLst>
+          </p:cNvPr>
+          <p:cNvSpPr>
+            <a:spLocks noGrp="1"/>
+          </p:cNvSpPr>
+          <p:nvPr>
+            <p:ph type="title"/>
+          </p:nvPr>
+        </p:nvSpPr>
+        <p:spPr/>
+        <p:txBody>
+          <a:bodyPr/>
+          <a:lstStyle/>
+          <a:p>
+            <a:r>
+              <a:rPr lang="en-US" dirty="0"/>
+              <a:t>Entity Framework (EF) Core (Mod 2 Topic 2)</a:t>
+            </a:r>
+          </a:p>
+        </p:txBody>
+      </p:sp>
+      <p:sp>
+        <p:nvSpPr>
+          <p:cNvPr id="3" name="Content Placeholder 2">
+            <a:extLst>
+              <a:ext uri="{FF2B5EF4-FFF2-40B4-BE49-F238E27FC236}">
+                <a16:creationId xmlns:a16="http://schemas.microsoft.com/office/drawing/2014/main" id="{4F29A2E5-CFD4-459C-90EB-841A941EBE61}"/>
+              </a:ext>
+            </a:extLst>
+          </p:cNvPr>
+          <p:cNvSpPr>
+            <a:spLocks noGrp="1"/>
+          </p:cNvSpPr>
+          <p:nvPr>
+            <p:ph idx="1"/>
+          </p:nvPr>
+        </p:nvSpPr>
+        <p:spPr/>
+        <p:txBody>
+          <a:bodyPr/>
+          <a:lstStyle/>
+          <a:p>
+            <a:r>
+              <a:rPr lang="en-US" dirty="0"/>
+              <a:t>EF YouTube Videos</a:t>
+            </a:r>
+          </a:p>
+          <a:p>
+            <a:pPr lvl="1"/>
+            <a:r>
+              <a:rPr lang="en-US" dirty="0"/>
+              <a:t>http://www.youtube.com/watch?v=PpqdsJDvcxY</a:t>
+            </a:r>
+          </a:p>
+          <a:p>
+            <a:pPr lvl="1"/>
+            <a:r>
+              <a:rPr lang="en-US" dirty="0"/>
+              <a:t>http://www.youtube.com/watch?v=-sftSA9_X-k</a:t>
+            </a:r>
+          </a:p>
+          <a:p>
+            <a:pPr lvl="1"/>
+            <a:r>
+              <a:rPr lang="en-US" dirty="0"/>
+              <a:t>http://www.youtube.com/watch?v=-FCzoUL47ds</a:t>
+            </a:r>
+          </a:p>
+          <a:p>
+            <a:pPr lvl="1"/>
+            <a:r>
+              <a:rPr lang="en-US" dirty="0"/>
+              <a:t>http://www.youtube.com/watch?v=gV_XvdgYwyU</a:t>
+            </a:r>
+          </a:p>
+          <a:p>
+            <a:pPr lvl="1"/>
+            <a:r>
+              <a:rPr lang="en-US" dirty="0"/>
+              <a:t>http://www.youtube.com/watch?v=G1Ip4pNbpcE</a:t>
+            </a:r>
+          </a:p>
+        </p:txBody>
+      </p:sp>
+    </p:spTree>
+    <p:extLst>
+      <p:ext uri="{BB962C8B-B14F-4D97-AF65-F5344CB8AC3E}">
+        <p14:creationId xmlns:p14="http://schemas.microsoft.com/office/powerpoint/2010/main" val="1568789045"/>
+      </p:ext>
+    </p:extLst>
+  </p:cSld>
+  <p:clrMapOvr>
+    <a:masterClrMapping/>
+  </p:clrMapOvr>
+</p:sld>
+</file>
+
+<file path=ppt/slides/slide11.xml><?xml version="1.0" encoding="utf-8"?>
+<p:sld xmlns:a="http://schemas.openxmlformats.org/drawingml/2006/main" xmlns:r="http://schemas.openxmlformats.org/officeDocument/2006/relationships" xmlns:p="http://schemas.openxmlformats.org/presentationml/2006/main">
+  <p:cSld>
+    <p:spTree>
+      <p:nvGrpSpPr>
+        <p:cNvPr id="1" name=""/>
+        <p:cNvGrpSpPr/>
+        <p:nvPr/>
+      </p:nvGrpSpPr>
+      <p:grpSpPr>
+        <a:xfrm>
+          <a:off x="0" y="0"/>
+          <a:ext cx="0" cy="0"/>
+          <a:chOff x="0" y="0"/>
+          <a:chExt cx="0" cy="0"/>
+        </a:xfrm>
+      </p:grpSpPr>
+      <p:sp>
+        <p:nvSpPr>
+          <p:cNvPr id="2" name="Title 1">
+            <a:extLst>
+              <a:ext uri="{FF2B5EF4-FFF2-40B4-BE49-F238E27FC236}">
+                <a16:creationId xmlns:a16="http://schemas.microsoft.com/office/drawing/2014/main" id="{B35CAFC0-4AE5-41E0-ACF7-C0D84855D71B}"/>
+              </a:ext>
+            </a:extLst>
+          </p:cNvPr>
+          <p:cNvSpPr>
+            <a:spLocks noGrp="1"/>
+          </p:cNvSpPr>
+          <p:nvPr>
+            <p:ph type="title"/>
+          </p:nvPr>
+        </p:nvSpPr>
+        <p:spPr/>
+        <p:txBody>
+          <a:bodyPr/>
+          <a:lstStyle/>
+          <a:p>
+            <a:r>
+              <a:rPr lang="en-US" dirty="0"/>
+              <a:t>EF Core Install</a:t>
+            </a:r>
+          </a:p>
+        </p:txBody>
+      </p:sp>
+      <p:sp>
+        <p:nvSpPr>
+          <p:cNvPr id="3" name="Content Placeholder 2">
+            <a:extLst>
+              <a:ext uri="{FF2B5EF4-FFF2-40B4-BE49-F238E27FC236}">
+                <a16:creationId xmlns:a16="http://schemas.microsoft.com/office/drawing/2014/main" id="{07FE347C-0B45-4820-9DB0-E88A8A5C2501}"/>
+              </a:ext>
+            </a:extLst>
+          </p:cNvPr>
+          <p:cNvSpPr>
+            <a:spLocks noGrp="1"/>
+          </p:cNvSpPr>
+          <p:nvPr>
+            <p:ph idx="1"/>
+          </p:nvPr>
+        </p:nvSpPr>
+        <p:spPr/>
+        <p:txBody>
+          <a:bodyPr>
+            <a:normAutofit fontScale="92500" lnSpcReduction="20000"/>
+          </a:bodyPr>
+          <a:lstStyle/>
+          <a:p>
+            <a:r>
+              <a:rPr lang="en-US" dirty="0"/>
+              <a:t>Tools -&gt; </a:t>
+            </a:r>
+            <a:r>
+              <a:rPr lang="en-US" dirty="0" err="1"/>
+              <a:t>Nuget</a:t>
+            </a:r>
+            <a:r>
+              <a:rPr lang="en-US" dirty="0"/>
+              <a:t> Package Manager -&gt; Manage NuGet Packages</a:t>
+            </a:r>
+          </a:p>
+          <a:p>
+            <a:pPr lvl="1"/>
+            <a:r>
+              <a:rPr lang="en-US" dirty="0"/>
+              <a:t>Or Right click on Dependencies -&gt; Manage NuGet Packages</a:t>
+            </a:r>
+          </a:p>
+          <a:p>
+            <a:r>
+              <a:rPr lang="en-US" dirty="0"/>
+              <a:t>Browse -&gt; ‘</a:t>
+            </a:r>
+            <a:r>
+              <a:rPr lang="en-US" dirty="0" err="1"/>
+              <a:t>Microsoft.EntityFrameworkCore.SqlServer</a:t>
+            </a:r>
+            <a:r>
+              <a:rPr lang="en-US" dirty="0"/>
+              <a:t>’</a:t>
+            </a:r>
+          </a:p>
+          <a:p>
+            <a:pPr lvl="1"/>
+            <a:r>
+              <a:rPr lang="en-US" dirty="0"/>
+              <a:t>Make sure you include ‘.</a:t>
+            </a:r>
+            <a:r>
+              <a:rPr lang="en-US" dirty="0" err="1"/>
+              <a:t>SqlServer</a:t>
+            </a:r>
+            <a:r>
+              <a:rPr lang="en-US" dirty="0"/>
+              <a:t>’</a:t>
+            </a:r>
+          </a:p>
+          <a:p>
+            <a:r>
+              <a:rPr lang="en-US" dirty="0"/>
+              <a:t>Install</a:t>
+            </a:r>
+          </a:p>
+          <a:p>
+            <a:pPr lvl="1"/>
+            <a:r>
+              <a:rPr lang="en-US" dirty="0"/>
+              <a:t>VS2019 .NET 5.0: 5.0.13</a:t>
+            </a:r>
+          </a:p>
+          <a:p>
+            <a:pPr lvl="1"/>
+            <a:r>
+              <a:rPr lang="en-US" dirty="0"/>
+              <a:t>VS2022 .NET 6.0: 6.0.3</a:t>
+            </a:r>
+          </a:p>
+          <a:p>
+            <a:r>
+              <a:rPr lang="en-US" dirty="0"/>
+              <a:t>Accept License</a:t>
+            </a:r>
+          </a:p>
+          <a:p>
+            <a:r>
+              <a:rPr lang="en-US" dirty="0"/>
+              <a:t>Browse -&gt; ‘</a:t>
+            </a:r>
+            <a:r>
+              <a:rPr lang="en-US" dirty="0" err="1"/>
+              <a:t>Microsoft.EntityFrameworkCore.Tools</a:t>
+            </a:r>
+            <a:r>
+              <a:rPr lang="en-US" dirty="0"/>
+              <a:t>’</a:t>
+            </a:r>
+          </a:p>
+          <a:p>
+            <a:pPr lvl="1"/>
+            <a:r>
+              <a:rPr lang="en-US" dirty="0"/>
+              <a:t>VS2019 .NET 5.0: 5.0.13</a:t>
+            </a:r>
+          </a:p>
+          <a:p>
+            <a:pPr lvl="1"/>
+            <a:r>
+              <a:rPr lang="en-US" dirty="0"/>
+              <a:t>VS2022 .NET 6.0: 6.0.3</a:t>
+            </a:r>
+          </a:p>
+          <a:p>
+            <a:r>
+              <a:rPr lang="en-US" dirty="0"/>
+              <a:t>Accept License</a:t>
+            </a:r>
+          </a:p>
+        </p:txBody>
+      </p:sp>
+    </p:spTree>
+    <p:extLst>
+      <p:ext uri="{BB962C8B-B14F-4D97-AF65-F5344CB8AC3E}">
+        <p14:creationId xmlns:p14="http://schemas.microsoft.com/office/powerpoint/2010/main" val="3046230905"/>
+      </p:ext>
+    </p:extLst>
+  </p:cSld>
+  <p:clrMapOvr>
+    <a:masterClrMapping/>
+  </p:clrMapOvr>
+</p:sld>
+</file>
+
+<file path=ppt/slides/slide12.xml><?xml version="1.0" encoding="utf-8"?>
+<p:sld xmlns:a="http://schemas.openxmlformats.org/drawingml/2006/main" xmlns:r="http://schemas.openxmlformats.org/officeDocument/2006/relationships" xmlns:p="http://schemas.openxmlformats.org/presentationml/2006/main">
+  <p:cSld>
+    <p:spTree>
+      <p:nvGrpSpPr>
+        <p:cNvPr id="1" name=""/>
+        <p:cNvGrpSpPr/>
+        <p:nvPr/>
+      </p:nvGrpSpPr>
+      <p:grpSpPr>
+        <a:xfrm>
+          <a:off x="0" y="0"/>
+          <a:ext cx="0" cy="0"/>
+          <a:chOff x="0" y="0"/>
+          <a:chExt cx="0" cy="0"/>
+        </a:xfrm>
+      </p:grpSpPr>
+      <p:sp>
+        <p:nvSpPr>
+          <p:cNvPr id="2" name="Title 1">
+            <a:extLst>
+              <a:ext uri="{FF2B5EF4-FFF2-40B4-BE49-F238E27FC236}">
+                <a16:creationId xmlns:a16="http://schemas.microsoft.com/office/drawing/2014/main" id="{F1D48114-E37C-48C9-AB28-234C79E45687}"/>
+              </a:ext>
+            </a:extLst>
+          </p:cNvPr>
+          <p:cNvSpPr>
+            <a:spLocks noGrp="1"/>
+          </p:cNvSpPr>
+          <p:nvPr>
+            <p:ph type="title"/>
+          </p:nvPr>
+        </p:nvSpPr>
+        <p:spPr/>
+        <p:txBody>
+          <a:bodyPr/>
+          <a:lstStyle/>
+          <a:p>
+            <a:r>
+              <a:rPr lang="en-US" dirty="0"/>
+              <a:t>EF Database Classes</a:t>
+            </a:r>
+          </a:p>
+        </p:txBody>
+      </p:sp>
+      <p:sp>
+        <p:nvSpPr>
+          <p:cNvPr id="3" name="Content Placeholder 2">
+            <a:extLst>
+              <a:ext uri="{FF2B5EF4-FFF2-40B4-BE49-F238E27FC236}">
+                <a16:creationId xmlns:a16="http://schemas.microsoft.com/office/drawing/2014/main" id="{78A16192-711B-4C91-9CD6-325BFB42F300}"/>
+              </a:ext>
+            </a:extLst>
+          </p:cNvPr>
+          <p:cNvSpPr>
+            <a:spLocks noGrp="1"/>
+          </p:cNvSpPr>
+          <p:nvPr>
+            <p:ph idx="1"/>
+          </p:nvPr>
+        </p:nvSpPr>
+        <p:spPr/>
+        <p:txBody>
+          <a:bodyPr/>
+          <a:lstStyle/>
+          <a:p>
+            <a:r>
+              <a:rPr lang="en-US" dirty="0" err="1"/>
+              <a:t>DbContext</a:t>
+            </a:r>
+            <a:r>
+              <a:rPr lang="en-US" dirty="0"/>
+              <a:t>: The primary class for communicating with a database</a:t>
+            </a:r>
+          </a:p>
+          <a:p>
+            <a:r>
+              <a:rPr lang="en-US" dirty="0" err="1"/>
+              <a:t>DbContextOptions</a:t>
+            </a:r>
+            <a:r>
+              <a:rPr lang="en-US" dirty="0"/>
+              <a:t>: Stores configuration options for </a:t>
+            </a:r>
+            <a:r>
+              <a:rPr lang="en-US" dirty="0" err="1"/>
+              <a:t>DbContext</a:t>
+            </a:r>
+            <a:endParaRPr lang="en-US" dirty="0"/>
+          </a:p>
+          <a:p>
+            <a:r>
+              <a:rPr lang="en-US" dirty="0" err="1"/>
+              <a:t>DbSet</a:t>
+            </a:r>
+            <a:r>
+              <a:rPr lang="en-US" dirty="0"/>
+              <a:t>&lt;Entity&gt;: A collection of objects created from the specified entity</a:t>
+            </a:r>
+          </a:p>
+        </p:txBody>
+      </p:sp>
+    </p:spTree>
+    <p:extLst>
+      <p:ext uri="{BB962C8B-B14F-4D97-AF65-F5344CB8AC3E}">
+        <p14:creationId xmlns:p14="http://schemas.microsoft.com/office/powerpoint/2010/main" val="3138785163"/>
+      </p:ext>
+    </p:extLst>
+  </p:cSld>
+  <p:clrMapOvr>
+    <a:masterClrMapping/>
+  </p:clrMapOvr>
+</p:sld>
+</file>
+
+<file path=ppt/slides/slide13.xml><?xml version="1.0" encoding="utf-8"?>
+<p:sld xmlns:a="http://schemas.openxmlformats.org/drawingml/2006/main" xmlns:r="http://schemas.openxmlformats.org/officeDocument/2006/relationships" xmlns:p="http://schemas.openxmlformats.org/presentationml/2006/main">
+  <p:cSld>
+    <p:spTree>
+      <p:nvGrpSpPr>
+        <p:cNvPr id="1" name=""/>
+        <p:cNvGrpSpPr/>
+        <p:nvPr/>
+      </p:nvGrpSpPr>
+      <p:grpSpPr>
+        <a:xfrm>
+          <a:off x="0" y="0"/>
+          <a:ext cx="0" cy="0"/>
+          <a:chOff x="0" y="0"/>
+          <a:chExt cx="0" cy="0"/>
+        </a:xfrm>
+      </p:grpSpPr>
+      <p:sp>
+        <p:nvSpPr>
+          <p:cNvPr id="2" name="Title 1">
+            <a:extLst>
+              <a:ext uri="{FF2B5EF4-FFF2-40B4-BE49-F238E27FC236}">
+                <a16:creationId xmlns:a16="http://schemas.microsoft.com/office/drawing/2014/main" id="{D8A37868-04DD-4C7F-A18D-F2B982DA5E36}"/>
+              </a:ext>
+            </a:extLst>
+          </p:cNvPr>
+          <p:cNvSpPr>
+            <a:spLocks noGrp="1"/>
+          </p:cNvSpPr>
+          <p:nvPr>
+            <p:ph type="title"/>
+          </p:nvPr>
+        </p:nvSpPr>
+        <p:spPr/>
+        <p:txBody>
+          <a:bodyPr/>
+          <a:lstStyle/>
+          <a:p>
+            <a:r>
+              <a:rPr lang="en-US" dirty="0"/>
+              <a:t>EF: </a:t>
+            </a:r>
+            <a:r>
+              <a:rPr lang="en-US" dirty="0" err="1"/>
+              <a:t>DbContext</a:t>
+            </a:r>
+            <a:endParaRPr lang="en-US" dirty="0"/>
+          </a:p>
+        </p:txBody>
+      </p:sp>
+      <p:sp>
+        <p:nvSpPr>
+          <p:cNvPr id="3" name="Content Placeholder 2">
+            <a:extLst>
+              <a:ext uri="{FF2B5EF4-FFF2-40B4-BE49-F238E27FC236}">
+                <a16:creationId xmlns:a16="http://schemas.microsoft.com/office/drawing/2014/main" id="{C8366D5A-6100-4BD9-B11A-F21ECC63D6D6}"/>
+              </a:ext>
+            </a:extLst>
+          </p:cNvPr>
+          <p:cNvSpPr>
+            <a:spLocks noGrp="1"/>
+          </p:cNvSpPr>
+          <p:nvPr>
+            <p:ph idx="1"/>
+          </p:nvPr>
+        </p:nvSpPr>
+        <p:spPr/>
+        <p:txBody>
+          <a:bodyPr/>
+          <a:lstStyle/>
+          <a:p>
+            <a:r>
+              <a:rPr lang="en-US" dirty="0"/>
+              <a:t>Primary class for communicating with the database</a:t>
+            </a:r>
+          </a:p>
+          <a:p>
+            <a:r>
+              <a:rPr lang="en-US" dirty="0"/>
+              <a:t>Uses your existing Models</a:t>
+            </a:r>
+          </a:p>
+          <a:p>
+            <a:r>
+              <a:rPr lang="en-US" dirty="0" err="1"/>
+              <a:t>DbSet</a:t>
+            </a:r>
+            <a:r>
+              <a:rPr lang="en-US" dirty="0"/>
+              <a:t>&lt;Model&gt; represents a table in the database</a:t>
+            </a:r>
+          </a:p>
+          <a:p>
+            <a:r>
+              <a:rPr lang="en-US" dirty="0"/>
+              <a:t>Can use </a:t>
+            </a:r>
+            <a:r>
+              <a:rPr lang="en-US" dirty="0" err="1"/>
+              <a:t>Linq</a:t>
+            </a:r>
+            <a:r>
+              <a:rPr lang="en-US" dirty="0"/>
+              <a:t> to query/access the database table</a:t>
+            </a:r>
+          </a:p>
+          <a:p>
+            <a:r>
+              <a:rPr lang="en-US" dirty="0" err="1"/>
+              <a:t>OnModelCreating</a:t>
+            </a:r>
+            <a:r>
+              <a:rPr lang="en-US" dirty="0"/>
+              <a:t>(</a:t>
+            </a:r>
+            <a:r>
+              <a:rPr lang="en-US" dirty="0" err="1"/>
+              <a:t>ModelBuilder</a:t>
+            </a:r>
+            <a:r>
+              <a:rPr lang="en-US" dirty="0"/>
+              <a:t>)</a:t>
+            </a:r>
+          </a:p>
+          <a:p>
+            <a:pPr lvl="1"/>
+            <a:r>
+              <a:rPr lang="en-US" dirty="0"/>
+              <a:t>Called by the framework when context is created</a:t>
+            </a:r>
+          </a:p>
+          <a:p>
+            <a:pPr lvl="1"/>
+            <a:r>
+              <a:rPr lang="en-US" dirty="0"/>
+              <a:t>Use “</a:t>
+            </a:r>
+            <a:r>
+              <a:rPr lang="en-US" dirty="0" err="1"/>
+              <a:t>HasData</a:t>
+            </a:r>
+            <a:r>
+              <a:rPr lang="en-US" dirty="0"/>
+              <a:t>” to seed data</a:t>
+            </a:r>
+          </a:p>
+          <a:p>
+            <a:r>
+              <a:rPr lang="en-US" dirty="0" err="1"/>
+              <a:t>Startup.cs</a:t>
+            </a:r>
+            <a:r>
+              <a:rPr lang="en-US" dirty="0"/>
+              <a:t>: Add DI object to create the </a:t>
+            </a:r>
+            <a:r>
+              <a:rPr lang="en-US" dirty="0" err="1"/>
+              <a:t>DbContext</a:t>
+            </a:r>
+            <a:endParaRPr lang="en-US" dirty="0"/>
+          </a:p>
+          <a:p>
+            <a:endParaRPr lang="en-US" dirty="0"/>
+          </a:p>
+        </p:txBody>
+      </p:sp>
+    </p:spTree>
+    <p:extLst>
+      <p:ext uri="{BB962C8B-B14F-4D97-AF65-F5344CB8AC3E}">
+        <p14:creationId xmlns:p14="http://schemas.microsoft.com/office/powerpoint/2010/main" val="229629794"/>
+      </p:ext>
+    </p:extLst>
+  </p:cSld>
+  <p:clrMapOvr>
+    <a:masterClrMapping/>
+  </p:clrMapOvr>
+</p:sld>
+</file>
+
+<file path=ppt/slides/slide14.xml><?xml version="1.0" encoding="utf-8"?>
+<p:sld xmlns:a="http://schemas.openxmlformats.org/drawingml/2006/main" xmlns:r="http://schemas.openxmlformats.org/officeDocument/2006/relationships" xmlns:p="http://schemas.openxmlformats.org/presentationml/2006/main">
+  <p:cSld>
+    <p:spTree>
+      <p:nvGrpSpPr>
+        <p:cNvPr id="1" name=""/>
+        <p:cNvGrpSpPr/>
+        <p:nvPr/>
+      </p:nvGrpSpPr>
+      <p:grpSpPr>
+        <a:xfrm>
+          <a:off x="0" y="0"/>
+          <a:ext cx="0" cy="0"/>
+          <a:chOff x="0" y="0"/>
+          <a:chExt cx="0" cy="0"/>
+        </a:xfrm>
+      </p:grpSpPr>
+      <p:sp>
+        <p:nvSpPr>
+          <p:cNvPr id="2" name="Title 1">
+            <a:extLst>
+              <a:ext uri="{FF2B5EF4-FFF2-40B4-BE49-F238E27FC236}">
+                <a16:creationId xmlns:a16="http://schemas.microsoft.com/office/drawing/2014/main" id="{0D6CEA55-8952-4BF3-BB2A-9439EAC2807C}"/>
+              </a:ext>
+            </a:extLst>
+          </p:cNvPr>
+          <p:cNvSpPr>
+            <a:spLocks noGrp="1"/>
+          </p:cNvSpPr>
+          <p:nvPr>
+            <p:ph type="title"/>
+          </p:nvPr>
+        </p:nvSpPr>
+        <p:spPr/>
+        <p:txBody>
+          <a:bodyPr/>
+          <a:lstStyle/>
+          <a:p>
+            <a:r>
+              <a:rPr lang="en-US" dirty="0"/>
+              <a:t>EF: Database Migrations</a:t>
+            </a:r>
+          </a:p>
+        </p:txBody>
+      </p:sp>
+      <p:sp>
+        <p:nvSpPr>
+          <p:cNvPr id="3" name="Content Placeholder 2">
+            <a:extLst>
+              <a:ext uri="{FF2B5EF4-FFF2-40B4-BE49-F238E27FC236}">
+                <a16:creationId xmlns:a16="http://schemas.microsoft.com/office/drawing/2014/main" id="{73C70569-3588-4B9E-B612-7C969DFFB130}"/>
+              </a:ext>
+            </a:extLst>
+          </p:cNvPr>
+          <p:cNvSpPr>
+            <a:spLocks noGrp="1"/>
+          </p:cNvSpPr>
+          <p:nvPr>
+            <p:ph idx="1"/>
+          </p:nvPr>
+        </p:nvSpPr>
+        <p:spPr/>
+        <p:txBody>
+          <a:bodyPr>
+            <a:normAutofit fontScale="92500" lnSpcReduction="10000"/>
+          </a:bodyPr>
+          <a:lstStyle/>
+          <a:p>
+            <a:r>
+              <a:rPr lang="en-US" dirty="0"/>
+              <a:t>Package Manager Console</a:t>
+            </a:r>
+          </a:p>
+          <a:p>
+            <a:pPr lvl="1"/>
+            <a:r>
+              <a:rPr lang="en-US" dirty="0"/>
+              <a:t>Tools -&gt; </a:t>
+            </a:r>
+            <a:r>
+              <a:rPr lang="en-US" dirty="0" err="1"/>
+              <a:t>NuGetPackage</a:t>
+            </a:r>
+            <a:r>
+              <a:rPr lang="en-US" dirty="0"/>
+              <a:t> Manager -&gt; Package Manager Console</a:t>
+            </a:r>
+          </a:p>
+          <a:p>
+            <a:r>
+              <a:rPr lang="en-US" dirty="0"/>
+              <a:t>Up(): Upgrades your database</a:t>
+            </a:r>
+          </a:p>
+          <a:p>
+            <a:r>
+              <a:rPr lang="en-US" dirty="0"/>
+              <a:t>Down(): Downgrades your database</a:t>
+            </a:r>
+          </a:p>
+          <a:p>
+            <a:r>
+              <a:rPr lang="en-US" dirty="0"/>
+              <a:t>Add-Migration Initial</a:t>
+            </a:r>
+          </a:p>
+          <a:p>
+            <a:pPr lvl="1"/>
+            <a:r>
+              <a:rPr lang="en-US" dirty="0"/>
+              <a:t>Creates your initial database snapshot</a:t>
+            </a:r>
+          </a:p>
+          <a:p>
+            <a:pPr lvl="1"/>
+            <a:r>
+              <a:rPr lang="en-US" dirty="0"/>
+              <a:t>Creates </a:t>
+            </a:r>
+            <a:r>
+              <a:rPr lang="en-US" dirty="0" err="1"/>
+              <a:t>MovieContextModelSnapshot.cs</a:t>
+            </a:r>
+            <a:endParaRPr lang="en-US" dirty="0"/>
+          </a:p>
+          <a:p>
+            <a:pPr lvl="1"/>
+            <a:r>
+              <a:rPr lang="en-US" dirty="0"/>
+              <a:t>Can only have one</a:t>
+            </a:r>
+          </a:p>
+          <a:p>
+            <a:r>
+              <a:rPr lang="en-US" dirty="0"/>
+              <a:t>Update-Database</a:t>
+            </a:r>
+          </a:p>
+          <a:p>
+            <a:pPr lvl="1"/>
+            <a:r>
+              <a:rPr lang="en-US" dirty="0"/>
+              <a:t>Uses your models to create actual SQL tables</a:t>
+            </a:r>
+          </a:p>
+          <a:p>
+            <a:r>
+              <a:rPr lang="en-US" dirty="0"/>
+              <a:t>__</a:t>
+            </a:r>
+            <a:r>
+              <a:rPr lang="en-US" dirty="0" err="1"/>
+              <a:t>EFMigrationsHistory</a:t>
+            </a:r>
+            <a:r>
+              <a:rPr lang="en-US" dirty="0"/>
+              <a:t> table shows migration history</a:t>
+            </a:r>
+          </a:p>
+        </p:txBody>
+      </p:sp>
+    </p:spTree>
+    <p:extLst>
+      <p:ext uri="{BB962C8B-B14F-4D97-AF65-F5344CB8AC3E}">
+        <p14:creationId xmlns:p14="http://schemas.microsoft.com/office/powerpoint/2010/main" val="2432842104"/>
+      </p:ext>
+    </p:extLst>
+  </p:cSld>
+  <p:clrMapOvr>
+    <a:masterClrMapping/>
+  </p:clrMapOvr>
+</p:sld>
+</file>
+
+<file path=ppt/slides/slide15.xml><?xml version="1.0" encoding="utf-8"?>
+<p:sld xmlns:a="http://schemas.openxmlformats.org/drawingml/2006/main" xmlns:r="http://schemas.openxmlformats.org/officeDocument/2006/relationships" xmlns:p="http://schemas.openxmlformats.org/presentationml/2006/main">
+  <p:cSld>
+    <p:spTree>
+      <p:nvGrpSpPr>
+        <p:cNvPr id="1" name=""/>
+        <p:cNvGrpSpPr/>
+        <p:nvPr/>
+      </p:nvGrpSpPr>
+      <p:grpSpPr>
+        <a:xfrm>
+          <a:off x="0" y="0"/>
+          <a:ext cx="0" cy="0"/>
+          <a:chOff x="0" y="0"/>
+          <a:chExt cx="0" cy="0"/>
+        </a:xfrm>
+      </p:grpSpPr>
+      <p:sp>
+        <p:nvSpPr>
+          <p:cNvPr id="2" name="Title 1">
+            <a:extLst>
+              <a:ext uri="{FF2B5EF4-FFF2-40B4-BE49-F238E27FC236}">
+                <a16:creationId xmlns:a16="http://schemas.microsoft.com/office/drawing/2014/main" id="{5890472B-6C7D-41F9-9978-A6483EEBD953}"/>
+              </a:ext>
+            </a:extLst>
+          </p:cNvPr>
+          <p:cNvSpPr>
+            <a:spLocks noGrp="1"/>
+          </p:cNvSpPr>
+          <p:nvPr>
+            <p:ph type="title"/>
+          </p:nvPr>
+        </p:nvSpPr>
+        <p:spPr/>
+        <p:txBody>
+          <a:bodyPr/>
+          <a:lstStyle/>
+          <a:p>
+            <a:r>
+              <a:rPr lang="en-US" dirty="0"/>
+              <a:t>EF: </a:t>
+            </a:r>
+            <a:r>
+              <a:rPr lang="en-US" dirty="0" err="1"/>
+              <a:t>Linq</a:t>
+            </a:r>
+            <a:r>
+              <a:rPr lang="en-US" dirty="0"/>
+              <a:t> Commands</a:t>
+            </a:r>
+          </a:p>
+        </p:txBody>
+      </p:sp>
+      <p:sp>
+        <p:nvSpPr>
+          <p:cNvPr id="3" name="Content Placeholder 2">
+            <a:extLst>
+              <a:ext uri="{FF2B5EF4-FFF2-40B4-BE49-F238E27FC236}">
+                <a16:creationId xmlns:a16="http://schemas.microsoft.com/office/drawing/2014/main" id="{18F30E79-CA05-4FFF-86B8-B360E2376BED}"/>
+              </a:ext>
+            </a:extLst>
+          </p:cNvPr>
+          <p:cNvSpPr>
+            <a:spLocks noGrp="1"/>
+          </p:cNvSpPr>
+          <p:nvPr>
+            <p:ph idx="1"/>
+          </p:nvPr>
+        </p:nvSpPr>
+        <p:spPr/>
+        <p:txBody>
+          <a:bodyPr/>
+          <a:lstStyle/>
+          <a:p>
+            <a:r>
+              <a:rPr lang="en-US" dirty="0"/>
+              <a:t>Language-Integrated Query</a:t>
+            </a:r>
+          </a:p>
+          <a:p>
+            <a:r>
+              <a:rPr lang="en-US" dirty="0"/>
+              <a:t>Where(lambda expression): Filters the entities</a:t>
+            </a:r>
+          </a:p>
+          <a:p>
+            <a:r>
+              <a:rPr lang="en-US" dirty="0" err="1"/>
+              <a:t>OrderBy</a:t>
+            </a:r>
+            <a:r>
+              <a:rPr lang="en-US" dirty="0"/>
+              <a:t>(lambda expression): Orders the entities</a:t>
+            </a:r>
+          </a:p>
+          <a:p>
+            <a:r>
+              <a:rPr lang="en-US" dirty="0" err="1"/>
+              <a:t>FirstOrDefault</a:t>
+            </a:r>
+            <a:r>
+              <a:rPr lang="en-US" dirty="0"/>
+              <a:t>(lambda express): Returns the first element or null</a:t>
+            </a:r>
+          </a:p>
+          <a:p>
+            <a:r>
+              <a:rPr lang="en-US" dirty="0" err="1"/>
+              <a:t>ToList</a:t>
+            </a:r>
+            <a:r>
+              <a:rPr lang="en-US" dirty="0"/>
+              <a:t>(): Converts the results to a list</a:t>
+            </a:r>
+          </a:p>
+          <a:p>
+            <a:pPr lvl="1"/>
+            <a:r>
+              <a:rPr lang="en-US" dirty="0"/>
+              <a:t>Executes the command at this point</a:t>
+            </a:r>
+          </a:p>
+          <a:p>
+            <a:r>
+              <a:rPr lang="en-US" dirty="0"/>
+              <a:t>Find(id): Finds the first element or null</a:t>
+            </a:r>
+          </a:p>
+          <a:p>
+            <a:pPr lvl="1"/>
+            <a:r>
+              <a:rPr lang="en-US" dirty="0"/>
+              <a:t>Must be the primary key of the entity</a:t>
+            </a:r>
+          </a:p>
+        </p:txBody>
+      </p:sp>
+    </p:spTree>
+    <p:extLst>
+      <p:ext uri="{BB962C8B-B14F-4D97-AF65-F5344CB8AC3E}">
+        <p14:creationId xmlns:p14="http://schemas.microsoft.com/office/powerpoint/2010/main" val="2782259670"/>
+      </p:ext>
+    </p:extLst>
+  </p:cSld>
+  <p:clrMapOvr>
+    <a:masterClrMapping/>
+  </p:clrMapOvr>
+</p:sld>
+</file>
+
+<file path=ppt/slides/slide16.xml><?xml version="1.0" encoding="utf-8"?>
+<p:sld xmlns:a="http://schemas.openxmlformats.org/drawingml/2006/main" xmlns:r="http://schemas.openxmlformats.org/officeDocument/2006/relationships" xmlns:p="http://schemas.openxmlformats.org/presentationml/2006/main">
+  <p:cSld>
+    <p:spTree>
+      <p:nvGrpSpPr>
+        <p:cNvPr id="1" name=""/>
+        <p:cNvGrpSpPr/>
+        <p:nvPr/>
+      </p:nvGrpSpPr>
+      <p:grpSpPr>
+        <a:xfrm>
+          <a:off x="0" y="0"/>
+          <a:ext cx="0" cy="0"/>
+          <a:chOff x="0" y="0"/>
+          <a:chExt cx="0" cy="0"/>
+        </a:xfrm>
+      </p:grpSpPr>
+      <p:sp>
+        <p:nvSpPr>
+          <p:cNvPr id="2" name="Title 1">
+            <a:extLst>
+              <a:ext uri="{FF2B5EF4-FFF2-40B4-BE49-F238E27FC236}">
+                <a16:creationId xmlns:a16="http://schemas.microsoft.com/office/drawing/2014/main" id="{FC2F6DEB-7439-4417-BB0D-0731498F985E}"/>
+              </a:ext>
+            </a:extLst>
+          </p:cNvPr>
+          <p:cNvSpPr>
+            <a:spLocks noGrp="1"/>
+          </p:cNvSpPr>
+          <p:nvPr>
+            <p:ph type="title"/>
+          </p:nvPr>
+        </p:nvSpPr>
+        <p:spPr/>
+        <p:txBody>
+          <a:bodyPr/>
+          <a:lstStyle/>
+          <a:p>
+            <a:r>
+              <a:rPr lang="en-US" dirty="0"/>
+              <a:t>EF: </a:t>
+            </a:r>
+            <a:r>
+              <a:rPr lang="en-US" dirty="0" err="1"/>
+              <a:t>Linq</a:t>
+            </a:r>
+            <a:r>
+              <a:rPr lang="en-US" dirty="0"/>
+              <a:t> Commands </a:t>
+            </a:r>
+            <a:r>
+              <a:rPr lang="en-US" dirty="0" err="1"/>
+              <a:t>cont</a:t>
+            </a:r>
+            <a:endParaRPr lang="en-US" dirty="0"/>
+          </a:p>
+        </p:txBody>
+      </p:sp>
+      <p:sp>
+        <p:nvSpPr>
+          <p:cNvPr id="3" name="Content Placeholder 2">
+            <a:extLst>
+              <a:ext uri="{FF2B5EF4-FFF2-40B4-BE49-F238E27FC236}">
+                <a16:creationId xmlns:a16="http://schemas.microsoft.com/office/drawing/2014/main" id="{BCD87D36-9D4D-4598-B963-5A99CA6DF090}"/>
+              </a:ext>
+            </a:extLst>
+          </p:cNvPr>
+          <p:cNvSpPr>
+            <a:spLocks noGrp="1"/>
+          </p:cNvSpPr>
+          <p:nvPr>
+            <p:ph idx="1"/>
+          </p:nvPr>
+        </p:nvSpPr>
+        <p:spPr/>
+        <p:txBody>
+          <a:bodyPr/>
+          <a:lstStyle/>
+          <a:p>
+            <a:r>
+              <a:rPr lang="en-US" dirty="0" err="1"/>
+              <a:t>IQueryable</a:t>
+            </a:r>
+            <a:r>
+              <a:rPr lang="en-US" dirty="0"/>
+              <a:t> is the query expression</a:t>
+            </a:r>
+          </a:p>
+          <a:p>
+            <a:pPr lvl="1"/>
+            <a:r>
+              <a:rPr lang="en-US" dirty="0" err="1"/>
+              <a:t>IQueryable</a:t>
+            </a:r>
+            <a:r>
+              <a:rPr lang="en-US" dirty="0"/>
+              <a:t> stay as an expression until they are executed</a:t>
+            </a:r>
+          </a:p>
+          <a:p>
+            <a:pPr lvl="1"/>
+            <a:r>
+              <a:rPr lang="en-US" dirty="0" err="1"/>
+              <a:t>IQueryable</a:t>
+            </a:r>
+            <a:r>
+              <a:rPr lang="en-US" dirty="0"/>
+              <a:t>&lt;Movie&gt; query = </a:t>
+            </a:r>
+            <a:r>
+              <a:rPr lang="en-US" dirty="0" err="1"/>
+              <a:t>context.Movies.OrderBy</a:t>
+            </a:r>
+            <a:r>
+              <a:rPr lang="en-US" dirty="0"/>
+              <a:t>(m =&gt; </a:t>
+            </a:r>
+            <a:r>
+              <a:rPr lang="en-US" dirty="0" err="1"/>
+              <a:t>m.Name</a:t>
+            </a:r>
+            <a:r>
+              <a:rPr lang="en-US" dirty="0"/>
+              <a:t>);</a:t>
+            </a:r>
+          </a:p>
+          <a:p>
+            <a:r>
+              <a:rPr lang="en-US" dirty="0"/>
+              <a:t>Execute a query express</a:t>
+            </a:r>
+          </a:p>
+          <a:p>
+            <a:pPr lvl="1"/>
+            <a:r>
+              <a:rPr lang="en-US" dirty="0" err="1"/>
+              <a:t>query.ToList</a:t>
+            </a:r>
+            <a:r>
+              <a:rPr lang="en-US" dirty="0"/>
+              <a:t>()</a:t>
+            </a:r>
+          </a:p>
+          <a:p>
+            <a:pPr lvl="1"/>
+            <a:r>
+              <a:rPr lang="en-US" dirty="0"/>
+              <a:t>Find(id)</a:t>
+            </a:r>
+          </a:p>
+        </p:txBody>
+      </p:sp>
+    </p:spTree>
+    <p:extLst>
+      <p:ext uri="{BB962C8B-B14F-4D97-AF65-F5344CB8AC3E}">
+        <p14:creationId xmlns:p14="http://schemas.microsoft.com/office/powerpoint/2010/main" val="2850754135"/>
+      </p:ext>
+    </p:extLst>
+  </p:cSld>
+  <p:clrMapOvr>
+    <a:masterClrMapping/>
+  </p:clrMapOvr>
+</p:sld>
+</file>
+
+<file path=ppt/slides/slide17.xml><?xml version="1.0" encoding="utf-8"?>
+<p:sld xmlns:a="http://schemas.openxmlformats.org/drawingml/2006/main" xmlns:r="http://schemas.openxmlformats.org/officeDocument/2006/relationships" xmlns:p="http://schemas.openxmlformats.org/presentationml/2006/main">
+  <p:cSld>
+    <p:spTree>
+      <p:nvGrpSpPr>
+        <p:cNvPr id="1" name=""/>
+        <p:cNvGrpSpPr/>
+        <p:nvPr/>
+      </p:nvGrpSpPr>
+      <p:grpSpPr>
+        <a:xfrm>
+          <a:off x="0" y="0"/>
+          <a:ext cx="0" cy="0"/>
+          <a:chOff x="0" y="0"/>
+          <a:chExt cx="0" cy="0"/>
+        </a:xfrm>
+      </p:grpSpPr>
+      <p:sp>
+        <p:nvSpPr>
+          <p:cNvPr id="2" name="Title 1">
+            <a:extLst>
+              <a:ext uri="{FF2B5EF4-FFF2-40B4-BE49-F238E27FC236}">
+                <a16:creationId xmlns:a16="http://schemas.microsoft.com/office/drawing/2014/main" id="{6EF2E3C9-AF7A-469C-B58F-CA75462ED640}"/>
+              </a:ext>
+            </a:extLst>
+          </p:cNvPr>
+          <p:cNvSpPr>
+            <a:spLocks noGrp="1"/>
+          </p:cNvSpPr>
+          <p:nvPr>
+            <p:ph type="title"/>
+          </p:nvPr>
+        </p:nvSpPr>
+        <p:spPr/>
+        <p:txBody>
+          <a:bodyPr/>
+          <a:lstStyle/>
+          <a:p>
+            <a:r>
+              <a:rPr lang="en-US" dirty="0"/>
+              <a:t>EF: Insert, Update, and Delete</a:t>
+            </a:r>
+          </a:p>
+        </p:txBody>
+      </p:sp>
+      <p:sp>
+        <p:nvSpPr>
+          <p:cNvPr id="3" name="Content Placeholder 2">
+            <a:extLst>
+              <a:ext uri="{FF2B5EF4-FFF2-40B4-BE49-F238E27FC236}">
+                <a16:creationId xmlns:a16="http://schemas.microsoft.com/office/drawing/2014/main" id="{18717128-02F4-4437-82E8-DBDE7E11EAB7}"/>
+              </a:ext>
+            </a:extLst>
+          </p:cNvPr>
+          <p:cNvSpPr>
+            <a:spLocks noGrp="1"/>
+          </p:cNvSpPr>
+          <p:nvPr>
+            <p:ph idx="1"/>
+          </p:nvPr>
+        </p:nvSpPr>
+        <p:spPr/>
+        <p:txBody>
+          <a:bodyPr/>
+          <a:lstStyle/>
+          <a:p>
+            <a:r>
+              <a:rPr lang="en-US" dirty="0"/>
+              <a:t>Add(entity): Adds the entity to the database</a:t>
+            </a:r>
+          </a:p>
+          <a:p>
+            <a:r>
+              <a:rPr lang="en-US" dirty="0"/>
+              <a:t>Update(entity): Updates any changed data on the entity</a:t>
+            </a:r>
+          </a:p>
+          <a:p>
+            <a:r>
+              <a:rPr lang="en-US" dirty="0"/>
+              <a:t>Remove(entity): Delete the entity in the </a:t>
+            </a:r>
+            <a:r>
+              <a:rPr lang="en-US" dirty="0" err="1"/>
+              <a:t>databse</a:t>
+            </a:r>
+            <a:endParaRPr lang="en-US" dirty="0"/>
+          </a:p>
+        </p:txBody>
+      </p:sp>
+    </p:spTree>
+    <p:extLst>
+      <p:ext uri="{BB962C8B-B14F-4D97-AF65-F5344CB8AC3E}">
+        <p14:creationId xmlns:p14="http://schemas.microsoft.com/office/powerpoint/2010/main" val="2013229238"/>
+      </p:ext>
+    </p:extLst>
+  </p:cSld>
+  <p:clrMapOvr>
+    <a:masterClrMapping/>
+  </p:clrMapOvr>
+</p:sld>
+</file>
+
+<file path=ppt/slides/slide18.xml><?xml version="1.0" encoding="utf-8"?>
+<p:sld xmlns:a="http://schemas.openxmlformats.org/drawingml/2006/main" xmlns:r="http://schemas.openxmlformats.org/officeDocument/2006/relationships" xmlns:p="http://schemas.openxmlformats.org/presentationml/2006/main">
+  <p:cSld>
+    <p:spTree>
+      <p:nvGrpSpPr>
+        <p:cNvPr id="1" name=""/>
+        <p:cNvGrpSpPr/>
+        <p:nvPr/>
+      </p:nvGrpSpPr>
+      <p:grpSpPr>
+        <a:xfrm>
+          <a:off x="0" y="0"/>
+          <a:ext cx="0" cy="0"/>
+          <a:chOff x="0" y="0"/>
+          <a:chExt cx="0" cy="0"/>
+        </a:xfrm>
+      </p:grpSpPr>
+      <p:sp>
+        <p:nvSpPr>
+          <p:cNvPr id="2" name="Title 1">
+            <a:extLst>
+              <a:ext uri="{FF2B5EF4-FFF2-40B4-BE49-F238E27FC236}">
+                <a16:creationId xmlns:a16="http://schemas.microsoft.com/office/drawing/2014/main" id="{ED8A04F0-DC74-45BB-95FA-C44139AA3510}"/>
+              </a:ext>
+            </a:extLst>
+          </p:cNvPr>
+          <p:cNvSpPr>
+            <a:spLocks noGrp="1"/>
+          </p:cNvSpPr>
+          <p:nvPr>
+            <p:ph type="title"/>
+          </p:nvPr>
+        </p:nvSpPr>
+        <p:spPr/>
+        <p:txBody>
+          <a:bodyPr/>
+          <a:lstStyle/>
+          <a:p>
+            <a:r>
+              <a:rPr lang="en-US" dirty="0"/>
+              <a:t>EF: Related Data</a:t>
+            </a:r>
+          </a:p>
+        </p:txBody>
+      </p:sp>
+      <p:sp>
+        <p:nvSpPr>
+          <p:cNvPr id="3" name="Content Placeholder 2">
+            <a:extLst>
+              <a:ext uri="{FF2B5EF4-FFF2-40B4-BE49-F238E27FC236}">
+                <a16:creationId xmlns:a16="http://schemas.microsoft.com/office/drawing/2014/main" id="{A8F393A1-5811-4864-B0D3-AF6BF26D22FA}"/>
+              </a:ext>
+            </a:extLst>
+          </p:cNvPr>
+          <p:cNvSpPr>
+            <a:spLocks noGrp="1"/>
+          </p:cNvSpPr>
+          <p:nvPr>
+            <p:ph idx="1"/>
+          </p:nvPr>
+        </p:nvSpPr>
+        <p:spPr/>
+        <p:txBody>
+          <a:bodyPr/>
+          <a:lstStyle/>
+          <a:p>
+            <a:r>
+              <a:rPr lang="en-US" dirty="0"/>
+              <a:t>Create new model</a:t>
+            </a:r>
+          </a:p>
+          <a:p>
+            <a:r>
+              <a:rPr lang="en-US" dirty="0"/>
+              <a:t>Create reference on existing model</a:t>
+            </a:r>
+          </a:p>
+          <a:p>
+            <a:r>
+              <a:rPr lang="en-US" dirty="0"/>
+              <a:t>Add new model, relational data, and seed data to </a:t>
+            </a:r>
+            <a:r>
+              <a:rPr lang="en-US" dirty="0" err="1"/>
+              <a:t>DbContext</a:t>
+            </a:r>
+            <a:endParaRPr lang="en-US" dirty="0"/>
+          </a:p>
+          <a:p>
+            <a:r>
+              <a:rPr lang="en-US" dirty="0"/>
+              <a:t>Create migration</a:t>
+            </a:r>
+          </a:p>
+          <a:p>
+            <a:pPr lvl="1"/>
+            <a:r>
+              <a:rPr lang="en-US" dirty="0"/>
+              <a:t>Add-Migration Genre</a:t>
+            </a:r>
+          </a:p>
+          <a:p>
+            <a:pPr lvl="1"/>
+            <a:r>
+              <a:rPr lang="en-US" dirty="0"/>
+              <a:t>Update-Database</a:t>
+            </a:r>
+          </a:p>
+        </p:txBody>
+      </p:sp>
+    </p:spTree>
+    <p:extLst>
+      <p:ext uri="{BB962C8B-B14F-4D97-AF65-F5344CB8AC3E}">
+        <p14:creationId xmlns:p14="http://schemas.microsoft.com/office/powerpoint/2010/main" val="4137718474"/>
+      </p:ext>
+    </p:extLst>
+  </p:cSld>
+  <p:clrMapOvr>
+    <a:masterClrMapping/>
+  </p:clrMapOvr>
+</p:sld>
+</file>
+
+<file path=ppt/slides/slide19.xml><?xml version="1.0" encoding="utf-8"?>
+<p:sld xmlns:a="http://schemas.openxmlformats.org/drawingml/2006/main" xmlns:r="http://schemas.openxmlformats.org/officeDocument/2006/relationships" xmlns:p="http://schemas.openxmlformats.org/presentationml/2006/main">
+  <p:cSld>
+    <p:spTree>
+      <p:nvGrpSpPr>
+        <p:cNvPr id="1" name=""/>
+        <p:cNvGrpSpPr/>
+        <p:nvPr/>
+      </p:nvGrpSpPr>
+      <p:grpSpPr>
+        <a:xfrm>
+          <a:off x="0" y="0"/>
+          <a:ext cx="0" cy="0"/>
+          <a:chOff x="0" y="0"/>
+          <a:chExt cx="0" cy="0"/>
+        </a:xfrm>
+      </p:grpSpPr>
+      <p:sp>
+        <p:nvSpPr>
+          <p:cNvPr id="2" name="Title 1">
+            <a:extLst>
+              <a:ext uri="{FF2B5EF4-FFF2-40B4-BE49-F238E27FC236}">
+                <a16:creationId xmlns:a16="http://schemas.microsoft.com/office/drawing/2014/main" id="{9817E611-A739-49FC-B7D2-D7E99E33C0B5}"/>
+              </a:ext>
+            </a:extLst>
+          </p:cNvPr>
+          <p:cNvSpPr>
+            <a:spLocks noGrp="1"/>
+          </p:cNvSpPr>
+          <p:nvPr>
+            <p:ph type="title"/>
+          </p:nvPr>
+        </p:nvSpPr>
+        <p:spPr/>
+        <p:txBody>
+          <a:bodyPr/>
+          <a:lstStyle/>
+          <a:p>
+            <a:r>
+              <a:rPr lang="en-US" dirty="0"/>
+              <a:t>EF: User Friendly URLs and Slugs</a:t>
+            </a:r>
+          </a:p>
+        </p:txBody>
+      </p:sp>
+      <p:sp>
+        <p:nvSpPr>
+          <p:cNvPr id="3" name="Content Placeholder 2">
+            <a:extLst>
+              <a:ext uri="{FF2B5EF4-FFF2-40B4-BE49-F238E27FC236}">
+                <a16:creationId xmlns:a16="http://schemas.microsoft.com/office/drawing/2014/main" id="{2B1558CE-C461-42C5-9386-98708C2217E9}"/>
+              </a:ext>
+            </a:extLst>
+          </p:cNvPr>
+          <p:cNvSpPr>
+            <a:spLocks noGrp="1"/>
+          </p:cNvSpPr>
+          <p:nvPr>
+            <p:ph idx="1"/>
+          </p:nvPr>
+        </p:nvSpPr>
+        <p:spPr/>
+        <p:txBody>
+          <a:bodyPr/>
+          <a:lstStyle/>
+          <a:p>
+            <a:r>
+              <a:rPr lang="en-US" dirty="0"/>
+              <a:t>User friendly URLs</a:t>
+            </a:r>
+          </a:p>
+          <a:p>
+            <a:pPr lvl="1"/>
+            <a:r>
+              <a:rPr lang="en-US" dirty="0"/>
+              <a:t>Set lowercase URLs and trailing slash in </a:t>
+            </a:r>
+            <a:r>
+              <a:rPr lang="en-US" dirty="0" err="1"/>
+              <a:t>Startup.ConfigureServices</a:t>
+            </a:r>
+            <a:endParaRPr lang="en-US" dirty="0"/>
+          </a:p>
+          <a:p>
+            <a:r>
+              <a:rPr lang="en-US" dirty="0"/>
+              <a:t>Slugs</a:t>
+            </a:r>
+          </a:p>
+          <a:p>
+            <a:pPr lvl="1"/>
+            <a:r>
+              <a:rPr lang="en-US" dirty="0"/>
+              <a:t>Add {slug?} to the </a:t>
+            </a:r>
+            <a:r>
+              <a:rPr lang="en-US" dirty="0" err="1"/>
+              <a:t>MapControllerRoute.pattern</a:t>
+            </a:r>
+            <a:r>
+              <a:rPr lang="en-US" dirty="0"/>
+              <a:t> in Startup</a:t>
+            </a:r>
+          </a:p>
+          <a:p>
+            <a:pPr lvl="1"/>
+            <a:r>
+              <a:rPr lang="en-US" dirty="0"/>
+              <a:t>Add </a:t>
+            </a:r>
+            <a:r>
+              <a:rPr lang="en-US" dirty="0" err="1"/>
+              <a:t>readonly</a:t>
+            </a:r>
+            <a:r>
+              <a:rPr lang="en-US" dirty="0"/>
+              <a:t> Slug property to ‘Movie’</a:t>
+            </a:r>
+          </a:p>
+          <a:p>
+            <a:endParaRPr lang="en-US" dirty="0"/>
+          </a:p>
+        </p:txBody>
+      </p:sp>
+    </p:spTree>
+    <p:extLst>
+      <p:ext uri="{BB962C8B-B14F-4D97-AF65-F5344CB8AC3E}">
+        <p14:creationId xmlns:p14="http://schemas.microsoft.com/office/powerpoint/2010/main" val="3281390829"/>
+      </p:ext>
+    </p:extLst>
+  </p:cSld>
+  <p:clrMapOvr>
+    <a:masterClrMapping/>
+  </p:clrMapOvr>
+</p:sld>
+</file>
+
 <file path=ppt/slides/slide2.xml><?xml version="1.0" encoding="utf-8"?>
 <p:sld xmlns:a="http://schemas.openxmlformats.org/drawingml/2006/main" xmlns:r="http://schemas.openxmlformats.org/officeDocument/2006/relationships" xmlns:p="http://schemas.openxmlformats.org/presentationml/2006/main">
   <p:cSld>
@@ -3530,6 +5002,349 @@
     <p:extLst>
       <p:ext uri="{BB962C8B-B14F-4D97-AF65-F5344CB8AC3E}">
         <p14:creationId xmlns:p14="http://schemas.microsoft.com/office/powerpoint/2010/main" val="2989554846"/>
+      </p:ext>
+    </p:extLst>
+  </p:cSld>
+  <p:clrMapOvr>
+    <a:masterClrMapping/>
+  </p:clrMapOvr>
+</p:sld>
+</file>
+
+<file path=ppt/slides/slide20.xml><?xml version="1.0" encoding="utf-8"?>
+<p:sld xmlns:a="http://schemas.openxmlformats.org/drawingml/2006/main" xmlns:r="http://schemas.openxmlformats.org/officeDocument/2006/relationships" xmlns:p="http://schemas.openxmlformats.org/presentationml/2006/main">
+  <p:cSld>
+    <p:spTree>
+      <p:nvGrpSpPr>
+        <p:cNvPr id="1" name=""/>
+        <p:cNvGrpSpPr/>
+        <p:nvPr/>
+      </p:nvGrpSpPr>
+      <p:grpSpPr>
+        <a:xfrm>
+          <a:off x="0" y="0"/>
+          <a:ext cx="0" cy="0"/>
+          <a:chOff x="0" y="0"/>
+          <a:chExt cx="0" cy="0"/>
+        </a:xfrm>
+      </p:grpSpPr>
+      <p:sp>
+        <p:nvSpPr>
+          <p:cNvPr id="2" name="Title 1">
+            <a:extLst>
+              <a:ext uri="{FF2B5EF4-FFF2-40B4-BE49-F238E27FC236}">
+                <a16:creationId xmlns:a16="http://schemas.microsoft.com/office/drawing/2014/main" id="{B0498AE2-17D8-4D4F-A388-35A8905DE80A}"/>
+              </a:ext>
+            </a:extLst>
+          </p:cNvPr>
+          <p:cNvSpPr>
+            <a:spLocks noGrp="1"/>
+          </p:cNvSpPr>
+          <p:nvPr>
+            <p:ph type="title"/>
+          </p:nvPr>
+        </p:nvSpPr>
+        <p:spPr/>
+        <p:txBody>
+          <a:bodyPr/>
+          <a:lstStyle/>
+          <a:p>
+            <a:r>
+              <a:rPr lang="en-US" dirty="0"/>
+              <a:t>Azure Database (Mod 2 Topic 2)</a:t>
+            </a:r>
+          </a:p>
+        </p:txBody>
+      </p:sp>
+      <p:sp>
+        <p:nvSpPr>
+          <p:cNvPr id="3" name="Content Placeholder 2">
+            <a:extLst>
+              <a:ext uri="{FF2B5EF4-FFF2-40B4-BE49-F238E27FC236}">
+                <a16:creationId xmlns:a16="http://schemas.microsoft.com/office/drawing/2014/main" id="{9F1D68F3-2057-4682-90E3-73E91BBD037C}"/>
+              </a:ext>
+            </a:extLst>
+          </p:cNvPr>
+          <p:cNvSpPr>
+            <a:spLocks noGrp="1"/>
+          </p:cNvSpPr>
+          <p:nvPr>
+            <p:ph idx="1"/>
+          </p:nvPr>
+        </p:nvSpPr>
+        <p:spPr/>
+        <p:txBody>
+          <a:bodyPr/>
+          <a:lstStyle/>
+          <a:p>
+            <a:r>
+              <a:rPr lang="en-US" dirty="0"/>
+              <a:t>Watch the video in Topic 2 titled ‘Azure SQL Database’</a:t>
+            </a:r>
+          </a:p>
+          <a:p>
+            <a:pPr lvl="1"/>
+            <a:r>
+              <a:rPr lang="en-US" dirty="0"/>
+              <a:t>The version are different but the process is similar</a:t>
+            </a:r>
+          </a:p>
+          <a:p>
+            <a:r>
+              <a:rPr lang="en-US" dirty="0"/>
+              <a:t>This is for the final project</a:t>
+            </a:r>
+          </a:p>
+          <a:p>
+            <a:r>
+              <a:rPr lang="en-US" dirty="0"/>
+              <a:t>You can use your local SQL Express for any assignment that IS NOT deployed to Azure</a:t>
+            </a:r>
+          </a:p>
+        </p:txBody>
+      </p:sp>
+    </p:spTree>
+    <p:extLst>
+      <p:ext uri="{BB962C8B-B14F-4D97-AF65-F5344CB8AC3E}">
+        <p14:creationId xmlns:p14="http://schemas.microsoft.com/office/powerpoint/2010/main" val="413458529"/>
+      </p:ext>
+    </p:extLst>
+  </p:cSld>
+  <p:clrMapOvr>
+    <a:masterClrMapping/>
+  </p:clrMapOvr>
+</p:sld>
+</file>
+
+<file path=ppt/slides/slide21.xml><?xml version="1.0" encoding="utf-8"?>
+<p:sld xmlns:a="http://schemas.openxmlformats.org/drawingml/2006/main" xmlns:r="http://schemas.openxmlformats.org/officeDocument/2006/relationships" xmlns:p="http://schemas.openxmlformats.org/presentationml/2006/main">
+  <p:cSld>
+    <p:spTree>
+      <p:nvGrpSpPr>
+        <p:cNvPr id="1" name=""/>
+        <p:cNvGrpSpPr/>
+        <p:nvPr/>
+      </p:nvGrpSpPr>
+      <p:grpSpPr>
+        <a:xfrm>
+          <a:off x="0" y="0"/>
+          <a:ext cx="0" cy="0"/>
+          <a:chOff x="0" y="0"/>
+          <a:chExt cx="0" cy="0"/>
+        </a:xfrm>
+      </p:grpSpPr>
+      <p:sp>
+        <p:nvSpPr>
+          <p:cNvPr id="2" name="Title 1">
+            <a:extLst>
+              <a:ext uri="{FF2B5EF4-FFF2-40B4-BE49-F238E27FC236}">
+                <a16:creationId xmlns:a16="http://schemas.microsoft.com/office/drawing/2014/main" id="{3D686D1D-D268-4879-99FE-53CCC0191796}"/>
+              </a:ext>
+            </a:extLst>
+          </p:cNvPr>
+          <p:cNvSpPr>
+            <a:spLocks noGrp="1"/>
+          </p:cNvSpPr>
+          <p:nvPr>
+            <p:ph type="title"/>
+          </p:nvPr>
+        </p:nvSpPr>
+        <p:spPr/>
+        <p:txBody>
+          <a:bodyPr/>
+          <a:lstStyle/>
+          <a:p>
+            <a:r>
+              <a:rPr lang="en-US" dirty="0"/>
+              <a:t>Multi-Page Web App w/DB (Mod 2 Topic 3)</a:t>
+            </a:r>
+          </a:p>
+        </p:txBody>
+      </p:sp>
+      <p:sp>
+        <p:nvSpPr>
+          <p:cNvPr id="3" name="Content Placeholder 2">
+            <a:extLst>
+              <a:ext uri="{FF2B5EF4-FFF2-40B4-BE49-F238E27FC236}">
+                <a16:creationId xmlns:a16="http://schemas.microsoft.com/office/drawing/2014/main" id="{A70C849F-22A3-4633-A01C-95E136E25116}"/>
+              </a:ext>
+            </a:extLst>
+          </p:cNvPr>
+          <p:cNvSpPr>
+            <a:spLocks noGrp="1"/>
+          </p:cNvSpPr>
+          <p:nvPr>
+            <p:ph idx="1"/>
+          </p:nvPr>
+        </p:nvSpPr>
+        <p:spPr/>
+        <p:txBody>
+          <a:bodyPr/>
+          <a:lstStyle/>
+          <a:p>
+            <a:r>
+              <a:rPr lang="en-US" dirty="0"/>
+              <a:t>Create a multi-page app with:</a:t>
+            </a:r>
+          </a:p>
+          <a:p>
+            <a:pPr lvl="1"/>
+            <a:r>
+              <a:rPr lang="en-US" dirty="0"/>
+              <a:t>A working database</a:t>
+            </a:r>
+          </a:p>
+          <a:p>
+            <a:pPr lvl="1"/>
+            <a:r>
+              <a:rPr lang="en-US" dirty="0"/>
+              <a:t>Pages that:</a:t>
+            </a:r>
+          </a:p>
+          <a:p>
+            <a:pPr lvl="2"/>
+            <a:r>
+              <a:rPr lang="en-US" dirty="0"/>
+              <a:t>List Contacts</a:t>
+            </a:r>
+          </a:p>
+          <a:p>
+            <a:pPr lvl="2"/>
+            <a:r>
+              <a:rPr lang="en-US" dirty="0"/>
+              <a:t>Add Contact</a:t>
+            </a:r>
+          </a:p>
+          <a:p>
+            <a:pPr lvl="2"/>
+            <a:r>
+              <a:rPr lang="en-US" dirty="0"/>
+              <a:t>Delete Contact</a:t>
+            </a:r>
+          </a:p>
+          <a:p>
+            <a:pPr lvl="1"/>
+            <a:r>
+              <a:rPr lang="en-US" dirty="0"/>
+              <a:t>Deployed to Azure</a:t>
+            </a:r>
+          </a:p>
+          <a:p>
+            <a:pPr lvl="2"/>
+            <a:r>
+              <a:rPr lang="en-US" dirty="0"/>
+              <a:t>You will need to make a new web page for this</a:t>
+            </a:r>
+          </a:p>
+          <a:p>
+            <a:pPr lvl="2"/>
+            <a:r>
+              <a:rPr lang="en-US" dirty="0"/>
+              <a:t>Can use the existing resource</a:t>
+            </a:r>
+          </a:p>
+        </p:txBody>
+      </p:sp>
+    </p:spTree>
+    <p:extLst>
+      <p:ext uri="{BB962C8B-B14F-4D97-AF65-F5344CB8AC3E}">
+        <p14:creationId xmlns:p14="http://schemas.microsoft.com/office/powerpoint/2010/main" val="1320096464"/>
+      </p:ext>
+    </p:extLst>
+  </p:cSld>
+  <p:clrMapOvr>
+    <a:masterClrMapping/>
+  </p:clrMapOvr>
+</p:sld>
+</file>
+
+<file path=ppt/slides/slide22.xml><?xml version="1.0" encoding="utf-8"?>
+<p:sld xmlns:a="http://schemas.openxmlformats.org/drawingml/2006/main" xmlns:r="http://schemas.openxmlformats.org/officeDocument/2006/relationships" xmlns:p="http://schemas.openxmlformats.org/presentationml/2006/main">
+  <p:cSld>
+    <p:spTree>
+      <p:nvGrpSpPr>
+        <p:cNvPr id="1" name=""/>
+        <p:cNvGrpSpPr/>
+        <p:nvPr/>
+      </p:nvGrpSpPr>
+      <p:grpSpPr>
+        <a:xfrm>
+          <a:off x="0" y="0"/>
+          <a:ext cx="0" cy="0"/>
+          <a:chOff x="0" y="0"/>
+          <a:chExt cx="0" cy="0"/>
+        </a:xfrm>
+      </p:grpSpPr>
+      <p:sp>
+        <p:nvSpPr>
+          <p:cNvPr id="2" name="Title 1">
+            <a:extLst>
+              <a:ext uri="{FF2B5EF4-FFF2-40B4-BE49-F238E27FC236}">
+                <a16:creationId xmlns:a16="http://schemas.microsoft.com/office/drawing/2014/main" id="{C197599F-4DAA-476E-BF5F-65C07275A55D}"/>
+              </a:ext>
+            </a:extLst>
+          </p:cNvPr>
+          <p:cNvSpPr>
+            <a:spLocks noGrp="1"/>
+          </p:cNvSpPr>
+          <p:nvPr>
+            <p:ph type="title"/>
+          </p:nvPr>
+        </p:nvSpPr>
+        <p:spPr/>
+        <p:txBody>
+          <a:bodyPr/>
+          <a:lstStyle/>
+          <a:p>
+            <a:r>
+              <a:rPr lang="en-US" dirty="0"/>
+              <a:t>Final Project (Mod 2 Topic 4)</a:t>
+            </a:r>
+          </a:p>
+        </p:txBody>
+      </p:sp>
+      <p:sp>
+        <p:nvSpPr>
+          <p:cNvPr id="3" name="Content Placeholder 2">
+            <a:extLst>
+              <a:ext uri="{FF2B5EF4-FFF2-40B4-BE49-F238E27FC236}">
+                <a16:creationId xmlns:a16="http://schemas.microsoft.com/office/drawing/2014/main" id="{5A10AEA6-84AC-42BB-BCF0-AA112F5A2969}"/>
+              </a:ext>
+            </a:extLst>
+          </p:cNvPr>
+          <p:cNvSpPr>
+            <a:spLocks noGrp="1"/>
+          </p:cNvSpPr>
+          <p:nvPr>
+            <p:ph idx="1"/>
+          </p:nvPr>
+        </p:nvSpPr>
+        <p:spPr/>
+        <p:txBody>
+          <a:bodyPr/>
+          <a:lstStyle/>
+          <a:p>
+            <a:r>
+              <a:rPr lang="en-US" dirty="0"/>
+              <a:t>Final project will include all of the topics covered in this class</a:t>
+            </a:r>
+          </a:p>
+          <a:p>
+            <a:r>
+              <a:rPr lang="en-US" dirty="0"/>
+              <a:t>Submit 3 potential </a:t>
+            </a:r>
+            <a:r>
+              <a:rPr lang="en-US"/>
+              <a:t>final projects</a:t>
+            </a:r>
+          </a:p>
+        </p:txBody>
+      </p:sp>
+    </p:spTree>
+    <p:extLst>
+      <p:ext uri="{BB962C8B-B14F-4D97-AF65-F5344CB8AC3E}">
+        <p14:creationId xmlns:p14="http://schemas.microsoft.com/office/powerpoint/2010/main" val="769933546"/>
       </p:ext>
     </p:extLst>
   </p:cSld>
@@ -3615,7 +5430,7 @@
           <a:p>
             <a:r>
               <a:rPr lang="en-US" dirty="0"/>
-              <a:t>Learn Entity Framework (EF) Core</a:t>
+              <a:t>Entity Framework (EF) Core</a:t>
             </a:r>
           </a:p>
           <a:p>
@@ -4042,7 +5857,7 @@
         </p:blipFill>
         <p:spPr>
           <a:xfrm>
-            <a:off x="5367034" y="1403621"/>
+            <a:off x="9661242" y="845766"/>
             <a:ext cx="1885950" cy="1638300"/>
           </a:xfrm>
           <a:prstGeom prst="rect">
@@ -4072,7 +5887,7 @@
         </p:blipFill>
         <p:spPr>
           <a:xfrm>
-            <a:off x="5514063" y="3181722"/>
+            <a:off x="9099267" y="2964707"/>
             <a:ext cx="2447925" cy="1057275"/>
           </a:xfrm>
           <a:prstGeom prst="rect">
@@ -4102,7 +5917,7 @@
         </p:blipFill>
         <p:spPr>
           <a:xfrm>
-            <a:off x="5178661" y="4373934"/>
+            <a:off x="1243269" y="3544495"/>
             <a:ext cx="4752975" cy="1771650"/>
           </a:xfrm>
           <a:prstGeom prst="rect">

</xml_diff>